<commit_message>
adding dictionary and final presentation
</commit_message>
<xml_diff>
--- a/images/playground.pptx
+++ b/images/playground.pptx
@@ -2973,13 +2973,13 @@
           <p:nvPr>
             <p:extLst>
               <p:ext uri="{D42A27DB-BD31-4B8C-83A1-F6EECF244321}">
-                <p14:modId xmlns:p14="http://schemas.microsoft.com/office/powerpoint/2010/main" val="1737918202"/>
+                <p14:modId xmlns:p14="http://schemas.microsoft.com/office/powerpoint/2010/main" val="962537479"/>
               </p:ext>
             </p:extLst>
           </p:nvPr>
         </p:nvGraphicFramePr>
         <p:xfrm>
-          <a:off x="3667125" y="3537127"/>
+          <a:off x="3630310" y="3552086"/>
           <a:ext cx="4208464" cy="1105677"/>
         </p:xfrm>
         <a:graphic>
@@ -3519,7 +3519,7 @@
           <p:nvPr>
             <p:extLst>
               <p:ext uri="{D42A27DB-BD31-4B8C-83A1-F6EECF244321}">
-                <p14:modId xmlns:p14="http://schemas.microsoft.com/office/powerpoint/2010/main" val="472845782"/>
+                <p14:modId xmlns:p14="http://schemas.microsoft.com/office/powerpoint/2010/main" val="813052094"/>
               </p:ext>
             </p:extLst>
           </p:nvPr>
@@ -3719,7 +3719,7 @@
           </a:prstGeom>
           <a:solidFill>
             <a:schemeClr val="bg2">
-              <a:lumMod val="90000"/>
+              <a:lumMod val="50000"/>
             </a:schemeClr>
           </a:solidFill>
           <a:ln>
@@ -3767,7 +3767,7 @@
           </a:prstGeom>
           <a:solidFill>
             <a:schemeClr val="bg2">
-              <a:lumMod val="90000"/>
+              <a:lumMod val="50000"/>
             </a:schemeClr>
           </a:solidFill>
           <a:ln>
@@ -3808,7 +3808,7 @@
           <p:nvPr>
             <p:extLst>
               <p:ext uri="{D42A27DB-BD31-4B8C-83A1-F6EECF244321}">
-                <p14:modId xmlns:p14="http://schemas.microsoft.com/office/powerpoint/2010/main" val="658917268"/>
+                <p14:modId xmlns:p14="http://schemas.microsoft.com/office/powerpoint/2010/main" val="528097997"/>
               </p:ext>
             </p:extLst>
           </p:nvPr>

</xml_diff>